<commit_message>
feat: add inference trace section and PDF download to results page
</commit_message>
<xml_diff>
--- a/frontend/public/presentation.pptx
+++ b/frontend/public/presentation.pptx
@@ -310,7 +310,7 @@
           <a:p>
             <a:fld id="{5BCAD085-E8A6-8845-BD4E-CB4CCA059FC4}" type="datetimeFigureOut">
               <a:rPr lang="en-US" smtClean="0"/>
-              <a:t>12/31/2025</a:t>
+              <a:t>1/14/2026</a:t>
             </a:fld>
             <a:endParaRPr lang="en-US"/>
           </a:p>
@@ -478,7 +478,7 @@
           <a:p>
             <a:fld id="{5BCAD085-E8A6-8845-BD4E-CB4CCA059FC4}" type="datetimeFigureOut">
               <a:rPr lang="en-US" smtClean="0"/>
-              <a:t>12/31/2025</a:t>
+              <a:t>1/14/2026</a:t>
             </a:fld>
             <a:endParaRPr lang="en-US"/>
           </a:p>
@@ -656,7 +656,7 @@
           <a:p>
             <a:fld id="{5BCAD085-E8A6-8845-BD4E-CB4CCA059FC4}" type="datetimeFigureOut">
               <a:rPr lang="en-US" smtClean="0"/>
-              <a:t>12/31/2025</a:t>
+              <a:t>1/14/2026</a:t>
             </a:fld>
             <a:endParaRPr lang="en-US"/>
           </a:p>
@@ -824,7 +824,7 @@
           <a:p>
             <a:fld id="{5BCAD085-E8A6-8845-BD4E-CB4CCA059FC4}" type="datetimeFigureOut">
               <a:rPr lang="en-US" smtClean="0"/>
-              <a:t>12/31/2025</a:t>
+              <a:t>1/14/2026</a:t>
             </a:fld>
             <a:endParaRPr lang="en-US"/>
           </a:p>
@@ -1069,7 +1069,7 @@
           <a:p>
             <a:fld id="{5BCAD085-E8A6-8845-BD4E-CB4CCA059FC4}" type="datetimeFigureOut">
               <a:rPr lang="en-US" smtClean="0"/>
-              <a:t>12/31/2025</a:t>
+              <a:t>1/14/2026</a:t>
             </a:fld>
             <a:endParaRPr lang="en-US"/>
           </a:p>
@@ -1354,7 +1354,7 @@
           <a:p>
             <a:fld id="{5BCAD085-E8A6-8845-BD4E-CB4CCA059FC4}" type="datetimeFigureOut">
               <a:rPr lang="en-US" smtClean="0"/>
-              <a:t>12/31/2025</a:t>
+              <a:t>1/14/2026</a:t>
             </a:fld>
             <a:endParaRPr lang="en-US"/>
           </a:p>
@@ -1773,7 +1773,7 @@
           <a:p>
             <a:fld id="{5BCAD085-E8A6-8845-BD4E-CB4CCA059FC4}" type="datetimeFigureOut">
               <a:rPr lang="en-US" smtClean="0"/>
-              <a:t>12/31/2025</a:t>
+              <a:t>1/14/2026</a:t>
             </a:fld>
             <a:endParaRPr lang="en-US"/>
           </a:p>
@@ -1890,7 +1890,7 @@
           <a:p>
             <a:fld id="{5BCAD085-E8A6-8845-BD4E-CB4CCA059FC4}" type="datetimeFigureOut">
               <a:rPr lang="en-US" smtClean="0"/>
-              <a:t>12/31/2025</a:t>
+              <a:t>1/14/2026</a:t>
             </a:fld>
             <a:endParaRPr lang="en-US"/>
           </a:p>
@@ -1985,7 +1985,7 @@
           <a:p>
             <a:fld id="{5BCAD085-E8A6-8845-BD4E-CB4CCA059FC4}" type="datetimeFigureOut">
               <a:rPr lang="en-US" smtClean="0"/>
-              <a:t>12/31/2025</a:t>
+              <a:t>1/14/2026</a:t>
             </a:fld>
             <a:endParaRPr lang="en-US"/>
           </a:p>
@@ -2260,7 +2260,7 @@
           <a:p>
             <a:fld id="{5BCAD085-E8A6-8845-BD4E-CB4CCA059FC4}" type="datetimeFigureOut">
               <a:rPr lang="en-US" smtClean="0"/>
-              <a:t>12/31/2025</a:t>
+              <a:t>1/14/2026</a:t>
             </a:fld>
             <a:endParaRPr lang="en-US"/>
           </a:p>
@@ -2512,7 +2512,7 @@
           <a:p>
             <a:fld id="{5BCAD085-E8A6-8845-BD4E-CB4CCA059FC4}" type="datetimeFigureOut">
               <a:rPr lang="en-US" smtClean="0"/>
-              <a:t>12/31/2025</a:t>
+              <a:t>1/14/2026</a:t>
             </a:fld>
             <a:endParaRPr lang="en-US"/>
           </a:p>
@@ -2723,7 +2723,7 @@
           <a:p>
             <a:fld id="{5BCAD085-E8A6-8845-BD4E-CB4CCA059FC4}" type="datetimeFigureOut">
               <a:rPr lang="en-US" smtClean="0"/>
-              <a:t>12/31/2025</a:t>
+              <a:t>1/14/2026</a:t>
             </a:fld>
             <a:endParaRPr lang="en-US"/>
           </a:p>
@@ -3367,8 +3367,8 @@
         </p:nvSpPr>
         <p:spPr>
           <a:xfrm>
-            <a:off x="3857528" y="4648200"/>
-            <a:ext cx="1847803" cy="257175"/>
+            <a:off x="3962166" y="4503700"/>
+            <a:ext cx="1638525" cy="546175"/>
           </a:xfrm>
           <a:prstGeom prst="rect">
             <a:avLst/>
@@ -3393,7 +3393,7 @@
               </a:spcAft>
             </a:pPr>
             <a:r>
-              <a:rPr sz="1076" b="0">
+              <a:rPr sz="1076" b="0" dirty="0">
                 <a:solidFill>
                   <a:srgbClr val="FFFFFF"/>
                 </a:solidFill>
@@ -3401,6 +3401,58 @@
               </a:rPr>
               <a:t>Mohamed Aziz Mansour</a:t>
             </a:r>
+            <a:endParaRPr lang="fr-FR" sz="1076" dirty="0">
+              <a:solidFill>
+                <a:srgbClr val="FFFFFF"/>
+              </a:solidFill>
+              <a:latin typeface="Roboto Flex"/>
+            </a:endParaRPr>
+          </a:p>
+          <a:p>
+            <a:pPr algn="ctr">
+              <a:lnSpc>
+                <a:spcPts val="1755"/>
+              </a:lnSpc>
+              <a:spcBef>
+                <a:spcPts val="0"/>
+              </a:spcBef>
+              <a:spcAft>
+                <a:spcPts val="0"/>
+              </a:spcAft>
+            </a:pPr>
+            <a:r>
+              <a:rPr lang="fr-FR" sz="1076" b="0" dirty="0" err="1">
+                <a:solidFill>
+                  <a:srgbClr val="FFFFFF"/>
+                </a:solidFill>
+                <a:latin typeface="Roboto Flex"/>
+              </a:rPr>
+              <a:t>Hiba</a:t>
+            </a:r>
+            <a:r>
+              <a:rPr lang="fr-FR" sz="1076" b="0" dirty="0">
+                <a:solidFill>
+                  <a:srgbClr val="FFFFFF"/>
+                </a:solidFill>
+                <a:latin typeface="Roboto Flex"/>
+              </a:rPr>
+              <a:t> </a:t>
+            </a:r>
+            <a:r>
+              <a:rPr lang="fr-FR" sz="1076" b="0">
+                <a:solidFill>
+                  <a:srgbClr val="FFFFFF"/>
+                </a:solidFill>
+                <a:latin typeface="Roboto Flex"/>
+              </a:rPr>
+              <a:t>Ibraham</a:t>
+            </a:r>
+            <a:endParaRPr sz="1076" b="0">
+              <a:solidFill>
+                <a:srgbClr val="FFFFFF"/>
+              </a:solidFill>
+              <a:latin typeface="Roboto Flex"/>
+            </a:endParaRPr>
           </a:p>
         </p:txBody>
       </p:sp>

</xml_diff>